<commit_message>
job #8949 updated mapping preso
</commit_message>
<xml_diff>
--- a/raven/presentations/mapping.pptx
+++ b/raven/presentations/mapping.pptx
@@ -5,10 +5,10 @@
     <p:sldMasterId id="2147483648" r:id="rId1"/>
   </p:sldMasterIdLst>
   <p:notesMasterIdLst>
-    <p:notesMasterId r:id="rId21"/>
+    <p:notesMasterId r:id="rId20"/>
   </p:notesMasterIdLst>
   <p:handoutMasterIdLst>
-    <p:handoutMasterId r:id="rId22"/>
+    <p:handoutMasterId r:id="rId21"/>
   </p:handoutMasterIdLst>
   <p:sldIdLst>
     <p:sldId id="637" r:id="rId2"/>
@@ -27,14 +27,13 @@
     <p:sldId id="789" r:id="rId15"/>
     <p:sldId id="790" r:id="rId16"/>
     <p:sldId id="791" r:id="rId17"/>
-    <p:sldId id="792" r:id="rId18"/>
-    <p:sldId id="788" r:id="rId19"/>
-    <p:sldId id="643" r:id="rId20"/>
+    <p:sldId id="788" r:id="rId18"/>
+    <p:sldId id="643" r:id="rId19"/>
   </p:sldIdLst>
   <p:sldSz cx="9144000" cy="6858000" type="letter"/>
   <p:notesSz cx="7315200" cy="9601200"/>
   <p:custDataLst>
-    <p:tags r:id="rId24"/>
+    <p:tags r:id="rId23"/>
   </p:custDataLst>
   <p:defaultTextStyle>
     <a:defPPr>
@@ -1335,7 +1334,7 @@
                 <a:ea typeface="ＭＳ Ｐゴシック" pitchFamily="34" charset="-128"/>
               </a:rPr>
               <a:pPr/>
-              <a:t>19</a:t>
+              <a:t>18</a:t>
             </a:fld>
             <a:endParaRPr lang="en-US">
               <a:latin typeface="Tahoma" pitchFamily="34" charset="0"/>
@@ -2972,9 +2971,6 @@
               </a:rPr>
               <a:t>Levi Starrett</a:t>
             </a:r>
-            <a:endParaRPr lang="en-US" dirty="0" smtClean="0">
-              <a:ea typeface="ＭＳ Ｐゴシック" pitchFamily="34" charset="-128"/>
-            </a:endParaRPr>
           </a:p>
         </p:txBody>
       </p:sp>
@@ -3109,9 +3105,6 @@
               </a:rPr>
               <a:t>Misc. differences</a:t>
             </a:r>
-            <a:endParaRPr lang="en-US" dirty="0" smtClean="0">
-              <a:ea typeface="ＭＳ Ｐゴシック" pitchFamily="34" charset="-128"/>
-            </a:endParaRPr>
           </a:p>
         </p:txBody>
       </p:sp>
@@ -3154,9 +3147,6 @@
               </a:rPr>
               <a:t>Identifier 1 maps to MASL “preferred” identifier</a:t>
             </a:r>
-            <a:endParaRPr lang="en-US" dirty="0" smtClean="0">
-              <a:ea typeface="ＭＳ Ｐゴシック" pitchFamily="34" charset="-128"/>
-            </a:endParaRPr>
           </a:p>
           <a:p>
             <a:pPr>
@@ -3209,9 +3199,6 @@
               </a:rPr>
               <a:t>This is a feature of the C model compiler</a:t>
             </a:r>
-            <a:endParaRPr lang="en-US" dirty="0" smtClean="0">
-              <a:ea typeface="ＭＳ Ｐゴシック" pitchFamily="34" charset="-128"/>
-            </a:endParaRPr>
           </a:p>
         </p:txBody>
       </p:sp>
@@ -3702,9 +3689,6 @@
               </a:rPr>
               <a:t>Activities</a:t>
             </a:r>
-            <a:endParaRPr lang="en-US" dirty="0" smtClean="0">
-              <a:ea typeface="ＭＳ Ｐゴシック" pitchFamily="34" charset="-128"/>
-            </a:endParaRPr>
           </a:p>
         </p:txBody>
       </p:sp>
@@ -4468,9 +4452,6 @@
               </a:rPr>
               <a:t>Activities</a:t>
             </a:r>
-            <a:endParaRPr lang="en-US" dirty="0" smtClean="0">
-              <a:ea typeface="ＭＳ Ｐゴシック" pitchFamily="34" charset="-128"/>
-            </a:endParaRPr>
           </a:p>
         </p:txBody>
       </p:sp>
@@ -4513,9 +4494,6 @@
               </a:rPr>
               <a:t>MASL terminator services/functions map to this activity</a:t>
             </a:r>
-            <a:endParaRPr lang="en-US" dirty="0" smtClean="0">
-              <a:ea typeface="ＭＳ Ｐゴシック" pitchFamily="34" charset="-128"/>
-            </a:endParaRPr>
           </a:p>
           <a:p>
             <a:pPr>
@@ -4579,13 +4557,7 @@
               <a:rPr lang="en-US" dirty="0" smtClean="0">
                 <a:ea typeface="ＭＳ Ｐゴシック" pitchFamily="34" charset="-128"/>
               </a:rPr>
-              <a:t>State is a state in a state machine (same </a:t>
-            </a:r>
-            <a:r>
-              <a:rPr lang="en-US" dirty="0" smtClean="0">
-                <a:ea typeface="ＭＳ Ｐゴシック" pitchFamily="34" charset="-128"/>
-              </a:rPr>
-              <a:t>as MASL)</a:t>
+              <a:t>State is a state in a state machine (same as MASL)</a:t>
             </a:r>
           </a:p>
           <a:p>
@@ -5188,9 +5160,6 @@
               </a:rPr>
               <a:t>Activities</a:t>
             </a:r>
-            <a:endParaRPr lang="en-US" dirty="0" smtClean="0">
-              <a:ea typeface="ＭＳ Ｐゴシック" pitchFamily="34" charset="-128"/>
-            </a:endParaRPr>
           </a:p>
         </p:txBody>
       </p:sp>
@@ -5233,9 +5202,6 @@
               </a:rPr>
               <a:t>MASL services are given the “void” return type</a:t>
             </a:r>
-            <a:endParaRPr lang="en-US" dirty="0" smtClean="0">
-              <a:ea typeface="ＭＳ Ｐゴシック" pitchFamily="34" charset="-128"/>
-            </a:endParaRPr>
           </a:p>
           <a:p>
             <a:pPr>
@@ -5651,9 +5617,6 @@
               </a:rPr>
               <a:t>Types</a:t>
             </a:r>
-            <a:endParaRPr lang="en-US" dirty="0" smtClean="0">
-              <a:ea typeface="ＭＳ Ｐゴシック" pitchFamily="34" charset="-128"/>
-            </a:endParaRPr>
           </a:p>
         </p:txBody>
       </p:sp>
@@ -6236,9 +6199,6 @@
               </a:rPr>
               <a:t>Types</a:t>
             </a:r>
-            <a:endParaRPr lang="en-US" dirty="0" smtClean="0">
-              <a:ea typeface="ＭＳ Ｐゴシック" pitchFamily="34" charset="-128"/>
-            </a:endParaRPr>
           </a:p>
         </p:txBody>
       </p:sp>
@@ -6304,26 +6264,13 @@
               <a:rPr lang="en-US" dirty="0" smtClean="0">
                 <a:ea typeface="ＭＳ Ｐゴシック" pitchFamily="34" charset="-128"/>
               </a:rPr>
-              <a:t>MASL user types are defined as a user defined type with type definition in description</a:t>
-            </a:r>
-          </a:p>
-          <a:p>
-            <a:pPr>
-              <a:spcAft>
-                <a:spcPts val="2400"/>
-              </a:spcAft>
-            </a:pPr>
+              <a:t>MASL user types are defined as a user defined type with type definition in </a:t>
+            </a:r>
             <a:r>
               <a:rPr lang="en-US" dirty="0" smtClean="0">
                 <a:ea typeface="ＭＳ Ｐゴシック" pitchFamily="34" charset="-128"/>
               </a:rPr>
-              <a:t>User defined types for MASL are derived from </a:t>
-            </a:r>
-            <a:r>
-              <a:rPr lang="en-US" i="1" dirty="0" err="1" smtClean="0">
-                <a:ea typeface="ＭＳ Ｐゴシック" pitchFamily="34" charset="-128"/>
-              </a:rPr>
-              <a:t>MASLtype</a:t>
+              <a:t>definition field</a:t>
             </a:r>
             <a:endParaRPr lang="en-US" dirty="0" smtClean="0">
               <a:ea typeface="ＭＳ Ｐゴシック" pitchFamily="34" charset="-128"/>
@@ -6485,53 +6432,6 @@
         <p:spPr>
           <a:xfrm>
             <a:off x="0" y="3114064"/>
-            <a:ext cx="781050" cy="415925"/>
-          </a:xfrm>
-          <a:prstGeom prst="rightArrow">
-            <a:avLst/>
-          </a:prstGeom>
-          <a:solidFill>
-            <a:srgbClr val="01AA8B"/>
-          </a:solidFill>
-          <a:ln w="9525" cap="flat" cmpd="sng" algn="ctr">
-            <a:noFill/>
-            <a:prstDash val="solid"/>
-          </a:ln>
-          <a:effectLst/>
-        </p:spPr>
-        <p:txBody>
-          <a:bodyPr anchor="ctr"/>
-          <a:lstStyle/>
-          <a:p>
-            <a:pPr algn="ctr" fontAlgn="auto">
-              <a:spcBef>
-                <a:spcPts val="0"/>
-              </a:spcBef>
-              <a:spcAft>
-                <a:spcPts val="0"/>
-              </a:spcAft>
-              <a:defRPr/>
-            </a:pPr>
-            <a:endParaRPr lang="en-US" sz="1800" kern="0" dirty="0">
-              <a:solidFill>
-                <a:srgbClr val="FFFFFF"/>
-              </a:solidFill>
-              <a:latin typeface="Tahoma"/>
-              <a:ea typeface="+mn-ea"/>
-              <a:cs typeface="+mn-cs"/>
-            </a:endParaRPr>
-          </a:p>
-        </p:txBody>
-      </p:sp>
-      <p:sp>
-        <p:nvSpPr>
-          <p:cNvPr id="9" name="Right Arrow 8"/>
-          <p:cNvSpPr/>
-          <p:nvPr/>
-        </p:nvSpPr>
-        <p:spPr>
-          <a:xfrm>
-            <a:off x="0" y="4246194"/>
             <a:ext cx="781050" cy="415925"/>
           </a:xfrm>
           <a:prstGeom prst="rightArrow">
@@ -6697,59 +6597,6 @@
                       </p:childTnLst>
                     </p:cTn>
                   </p:par>
-                  <p:par>
-                    <p:cTn id="13" fill="hold">
-                      <p:stCondLst>
-                        <p:cond delay="indefinite"/>
-                      </p:stCondLst>
-                      <p:childTnLst>
-                        <p:par>
-                          <p:cTn id="14" fill="hold">
-                            <p:stCondLst>
-                              <p:cond delay="0"/>
-                            </p:stCondLst>
-                            <p:childTnLst>
-                              <p:par>
-                                <p:cTn id="15" presetID="22" presetClass="entr" presetSubtype="8" fill="hold" grpId="0" nodeType="clickEffect">
-                                  <p:stCondLst>
-                                    <p:cond delay="0"/>
-                                  </p:stCondLst>
-                                  <p:childTnLst>
-                                    <p:set>
-                                      <p:cBhvr>
-                                        <p:cTn id="16" dur="1" fill="hold">
-                                          <p:stCondLst>
-                                            <p:cond delay="0"/>
-                                          </p:stCondLst>
-                                        </p:cTn>
-                                        <p:tgtEl>
-                                          <p:spTgt spid="9"/>
-                                        </p:tgtEl>
-                                        <p:attrNameLst>
-                                          <p:attrName>style.visibility</p:attrName>
-                                        </p:attrNameLst>
-                                      </p:cBhvr>
-                                      <p:to>
-                                        <p:strVal val="visible"/>
-                                      </p:to>
-                                    </p:set>
-                                    <p:animEffect transition="in" filter="wipe(left)">
-                                      <p:cBhvr>
-                                        <p:cTn id="17" dur="500"/>
-                                        <p:tgtEl>
-                                          <p:spTgt spid="9"/>
-                                        </p:tgtEl>
-                                      </p:cBhvr>
-                                    </p:animEffect>
-                                  </p:childTnLst>
-                                </p:cTn>
-                              </p:par>
-                            </p:childTnLst>
-                          </p:cTn>
-                        </p:par>
-                      </p:childTnLst>
-                    </p:cTn>
-                  </p:par>
                 </p:childTnLst>
               </p:cTn>
               <p:prevCondLst>
@@ -6774,7 +6621,6 @@
     <p:bldLst>
       <p:bldP spid="7" grpId="0" animBg="1"/>
       <p:bldP spid="8" grpId="0" animBg="1"/>
-      <p:bldP spid="9" grpId="0" animBg="1"/>
     </p:bldLst>
   </p:timing>
 </p:sld>
@@ -6818,9 +6664,6 @@
               </a:rPr>
               <a:t>Marking</a:t>
             </a:r>
-            <a:endParaRPr lang="en-US" dirty="0" smtClean="0">
-              <a:ea typeface="ＭＳ Ｐゴシック" pitchFamily="34" charset="-128"/>
-            </a:endParaRPr>
           </a:p>
         </p:txBody>
       </p:sp>
@@ -6873,7 +6716,25 @@
               <a:rPr lang="en-US" dirty="0" smtClean="0">
                 <a:ea typeface="ＭＳ Ｐゴシック" pitchFamily="34" charset="-128"/>
               </a:rPr>
-              <a:t> files that are loaded and interpreted before the compiler is run</a:t>
+              <a:t> files that are loaded and interpreted </a:t>
+            </a:r>
+            <a:r>
+              <a:rPr lang="en-US" dirty="0" smtClean="0">
+                <a:ea typeface="ＭＳ Ｐゴシック" pitchFamily="34" charset="-128"/>
+              </a:rPr>
+              <a:t>when the model </a:t>
+            </a:r>
+            <a:r>
+              <a:rPr lang="en-US" dirty="0" smtClean="0">
+                <a:ea typeface="ＭＳ Ｐゴシック" pitchFamily="34" charset="-128"/>
+              </a:rPr>
+              <a:t>compiler </a:t>
+            </a:r>
+            <a:r>
+              <a:rPr lang="en-US" dirty="0" smtClean="0">
+                <a:ea typeface="ＭＳ Ｐゴシック" pitchFamily="34" charset="-128"/>
+              </a:rPr>
+              <a:t>is run</a:t>
             </a:r>
           </a:p>
           <a:p>
@@ -6899,7 +6760,25 @@
               <a:rPr lang="en-US" dirty="0" smtClean="0">
                 <a:ea typeface="ＭＳ Ｐゴシック" pitchFamily="34" charset="-128"/>
               </a:rPr>
-              <a:t>MASL pragmas are mapped to xtUML model element description fields</a:t>
+              <a:t>MASL </a:t>
+            </a:r>
+            <a:r>
+              <a:rPr lang="en-US" dirty="0" smtClean="0">
+                <a:ea typeface="ＭＳ Ｐゴシック" pitchFamily="34" charset="-128"/>
+              </a:rPr>
+              <a:t>are stored similarly in a </a:t>
+            </a:r>
+            <a:r>
+              <a:rPr lang="en-US" i="1" dirty="0" smtClean="0">
+                <a:ea typeface="ＭＳ Ｐゴシック" pitchFamily="34" charset="-128"/>
+              </a:rPr>
+              <a:t>mark</a:t>
+            </a:r>
+            <a:r>
+              <a:rPr lang="en-US" dirty="0" smtClean="0">
+                <a:ea typeface="ＭＳ Ｐゴシック" pitchFamily="34" charset="-128"/>
+              </a:rPr>
+              <a:t> file and inserted into the MASL data at export time</a:t>
             </a:r>
           </a:p>
         </p:txBody>
@@ -7372,200 +7251,6 @@
       </p:grpSpPr>
       <p:sp>
         <p:nvSpPr>
-          <p:cNvPr id="11265" name="Title 1"/>
-          <p:cNvSpPr>
-            <a:spLocks noGrp="1"/>
-          </p:cNvSpPr>
-          <p:nvPr>
-            <p:ph type="title"/>
-          </p:nvPr>
-        </p:nvSpPr>
-        <p:spPr/>
-        <p:txBody>
-          <a:bodyPr/>
-          <a:lstStyle/>
-          <a:p>
-            <a:r>
-              <a:rPr lang="en-US" dirty="0" smtClean="0">
-                <a:ea typeface="ＭＳ Ｐゴシック" pitchFamily="34" charset="-128"/>
-              </a:rPr>
-              <a:t>Marking</a:t>
-            </a:r>
-            <a:endParaRPr lang="en-US" dirty="0" smtClean="0">
-              <a:ea typeface="ＭＳ Ｐゴシック" pitchFamily="34" charset="-128"/>
-            </a:endParaRPr>
-          </a:p>
-        </p:txBody>
-      </p:sp>
-      <p:pic>
-        <p:nvPicPr>
-          <p:cNvPr id="6" name="Content Placeholder 5"/>
-          <p:cNvPicPr>
-            <a:picLocks noGrp="1" noChangeAspect="1"/>
-          </p:cNvPicPr>
-          <p:nvPr>
-            <p:ph idx="1"/>
-          </p:nvPr>
-        </p:nvPicPr>
-        <p:blipFill>
-          <a:blip r:embed="rId2">
-            <a:extLst>
-              <a:ext uri="{28A0092B-C50C-407E-A947-70E740481C1C}">
-                <a14:useLocalDpi xmlns:a14="http://schemas.microsoft.com/office/drawing/2010/main" val="0"/>
-              </a:ext>
-            </a:extLst>
-          </a:blip>
-          <a:stretch>
-            <a:fillRect/>
-          </a:stretch>
-        </p:blipFill>
-        <p:spPr>
-          <a:xfrm>
-            <a:off x="807330" y="1612867"/>
-            <a:ext cx="7049789" cy="4274591"/>
-          </a:xfrm>
-        </p:spPr>
-      </p:pic>
-      <p:sp>
-        <p:nvSpPr>
-          <p:cNvPr id="4" name="Footer Placeholder 3"/>
-          <p:cNvSpPr>
-            <a:spLocks noGrp="1"/>
-          </p:cNvSpPr>
-          <p:nvPr>
-            <p:ph type="ftr" sz="quarter" idx="10"/>
-          </p:nvPr>
-        </p:nvSpPr>
-        <p:spPr/>
-        <p:txBody>
-          <a:bodyPr/>
-          <a:lstStyle/>
-          <a:p>
-            <a:pPr>
-              <a:defRPr/>
-            </a:pPr>
-            <a:r>
-              <a:rPr lang="en-US"/>
-              <a:t> </a:t>
-            </a:r>
-          </a:p>
-        </p:txBody>
-      </p:sp>
-      <p:sp>
-        <p:nvSpPr>
-          <p:cNvPr id="11268" name="Slide Number Placeholder 4"/>
-          <p:cNvSpPr>
-            <a:spLocks noGrp="1"/>
-          </p:cNvSpPr>
-          <p:nvPr>
-            <p:ph type="sldNum" sz="quarter" idx="11"/>
-          </p:nvPr>
-        </p:nvSpPr>
-        <p:spPr bwMode="auto">
-          <a:noFill/>
-          <a:ln>
-            <a:miter lim="800000"/>
-            <a:headEnd/>
-            <a:tailEnd/>
-          </a:ln>
-        </p:spPr>
-        <p:txBody>
-          <a:bodyPr wrap="square" numCol="1" compatLnSpc="1">
-            <a:prstTxWarp prst="textNoShape">
-              <a:avLst/>
-            </a:prstTxWarp>
-          </a:bodyPr>
-          <a:lstStyle/>
-          <a:p>
-            <a:fld id="{C2F3F489-80C5-41A2-8A4E-F5422125D0CE}" type="slidenum">
-              <a:rPr lang="en-US">
-                <a:latin typeface="Tahoma" pitchFamily="34" charset="0"/>
-                <a:ea typeface="ＭＳ Ｐゴシック" pitchFamily="34" charset="-128"/>
-              </a:rPr>
-              <a:pPr/>
-              <a:t>17</a:t>
-            </a:fld>
-            <a:endParaRPr lang="en-US">
-              <a:latin typeface="Tahoma" pitchFamily="34" charset="0"/>
-              <a:ea typeface="ＭＳ Ｐゴシック" pitchFamily="34" charset="-128"/>
-            </a:endParaRPr>
-          </a:p>
-        </p:txBody>
-      </p:sp>
-      <p:sp>
-        <p:nvSpPr>
-          <p:cNvPr id="11270" name="AutoShape 2" descr="data:image/jpeg;base64,/9j/4AAQSkZJRgABAQAAAQABAAD/2wBDAAkGBwgHBgkIBwgKCgkLDRYPDQwMDRsUFRAWIB0iIiAdHx8kKDQsJCYxJx8fLT0tMTU3Ojo6Iys/RD84QzQ5Ojf/2wBDAQoKCg0MDRoPDxo3JR8lNzc3Nzc3Nzc3Nzc3Nzc3Nzc3Nzc3Nzc3Nzc3Nzc3Nzc3Nzc3Nzc3Nzc3Nzc3Nzc3Nzf/wAARCACWAVADASIAAhEBAxEB/8QAHAABAQACAwEBAAAAAAAAAAAAAAECBwQFBgMI/8QAOhAAAQMDAwEHAgUCAwkAAAAAAQACAwQFEQYSITEHExRBUWFxIoEVFjJCkYKhUrHCCCMzNENykrLR/8QAGgEBAQEBAQEBAAAAAAAAAAAAAAECAwQGBf/EAC8RAQEAAgIBAgMFCAMAAAAAAAABAhEDEiEEMRNBURQiIzKhBRVSYYGx0fBxkcH/2gAMAwEAAhEDEQA/AN4oiICIiAiIgIiICIiAiIgIiICIiAiIgIiICIiAiIgIiICIiAiIgIiICIiAiIgIiICIiAiIgIiICIiAiIgIiICIiAiIgIiICIiAiIgIuFd7rQWaglrrpVR01NEMukkOB8D1PsOStV3HtVvd7lfDomzgU7Tt8fXDAPw3OB9yT7BS2SbrWGGWd1jN1uHKLRTna8q3b63V74nH9lNGGgfwAvrHVa9t/wDvKLU/iyP+lVxNId7ZIP8AmFz+Px/V6/3f6nW+reCLU9j7XJqOrjoNc2t1ukecNrYAXQu9yOcD3BPwFtSnqIaqCOemlZNDI0OZJG4Oa4HoQR1C6Sy+Y8eWNxurNV9ERFUEREBERAREQEREBERAREQEREBERAREQEREBERAREQEREBERAREQEREBce4VtPbqGetrJRFTwRmSSR3RrQMkrkLVXbvcp5aS06Yo3lsl1qAZSPKNhHB9txB/oS+Fktuo8jUVNZ2k3h12uwkisdO8toqLOA/HVzsefqfsOAvURRxxRtjiY1kbBhrWjAaPQBedpdSWmioo6aCGoY+GYUjKPux3u7y4z098rvI6+jfNJCyqgM0YzJGJWlzPXIzwvzeXLPK7vs+p9Fx8PDh1xst+bkIVx4q6jmdE2KqgkdK0ujDJGkvA6kc8hcO/X6jsUUUlaJXd64hrYmhx4GSeo4C5zG26evLkwxx7W+HNrqOmr6Z9NWQsmhf1Y8f39j7rqNJXyq7OL9Dba6d8umK+TEcjznwrz5/Hr6jnqCF2slyoYmxumrKeMSMEjO8la3c0+YyenK6/UEFDe6CqtPiKd1WWFzIu8bva8cg46j/AOErrw55YX+Tx+t9Px8+Hj809v8ADeIIIyOiq8L2M36S+aHpRUPLqmhcaSUnqduNpP8ASW/cFe6X6L5YREQEREBERAREQEREBERAREQEREBERAREQEREBERAREQERQqWioplMqdhUUymU7CrS3aOTL2x2hjz9MVsLmj3JlW6MrTnbDD+G670zfHZ7mZjqSR3k3k4yfiQn+lZzu8bHb09mPNhb9Y6x9hc7WDbxthEIptnnv7zpu6Y/TxnK6u36SrIJqOOaWlbDRmYtnjB72bvBj6hjjGfUr2a8zf75V2zUdtp4o5p6aaJ7pIIIg+R5GcY8+OvXyXhwyzviPpebh4cJ3ynz/vZ/iOLp/Tl0oK+3S1ktI6GigkhaIi7cQ4kgnI9T7fdcm+6drrzeROaxlNSR07oo9rd7iXcPyCMDIOM5zwF19u1hOyinmrozLK+4Op6eN+2HY3AP1noMZ5PK5n5xMkVJ4a2STVFRPJB3QmaAHtAIw7GC05HPC3ZydtuGOXpbx9N3Xv8/wDie39HztmmK1tXaJLoKSeOghfERku3cnYcFvlkfwvnQaSrKa5xSSzQvp4ax1S2UOxISecEbevkcuI9lyZdZxQ10kDqMmOGYQTPEw3tf5kMxlzQeMr080rIIZJpXBscbS559AOSs5Z8k9/m68fD6bOfdu9f7/4dhLjHcNX0jf8AhRV7SwemTIP9IW21qzsBpJDYbpeJm7XXKvc9vu1vn/5OcPstpZXvl1NPmM7LlbFRTKZTsyqKZTKdhUUyqrLsERFQREQEREBERAREQEWGVcrHddMkUBTK1tFRTKZTYqKZTKnYCVMqE8qLFyXTJCViinZdLlMqIs9hcplRE7C5Xme0XTDdW6Wqbc3aKpuJqV7ujZW5xn2IJafnK9KiTI00dpa7PraQ0tc10VxpD3VTFIMOBHGSP8/ddlNbaSe4U9wljJqadrmxP3EYB68dD1Xa9qWjqmdx1Pppu27UzczwtH/NRgenm4D+Rx1AXQ6cvNPfLayqg+l36ZYieY3enx6H0Xm5cOv3sfZ9H6H1ePPjOPP80/X+bH8uWvuZIvDkNfUeJJErg4Sf4g4HI+yzisdvidSlsDt1LI6SJxkcSHO6kknn7rs0XLvl9Xv+Dx/wz/p1j7DbX1rqx0DhK54kcBK8Mc8dHFoO0n5C6jVFRVXqug0nYx3ldWOAncOkMfU7j5ccn2+Vy9VXyS2xw0VujM91rHCOmhaMnJON2PnoPM/BXv8As00RHpO3PnrHCe9Vn1VdQTuxnnY0+gPU+Z59Md+LG/ny/o/K/aHqseOXi455vu9LYLVTWKy0drowe5pYhG0kcu9XH3JyT8rsMqIu/Z+FpcplRE7C5TKiqTIVZLELJdcUoiKZWtoqIioIiJsEUymVNioplMpuDDKZUymV4+za5VysCUyrOQ0zUUVWu4ZTKmUWe5pcplTKmVLkMsplY5TKnYVFCVMrNzXTJFjlVOwqKIr2FWku0Oyu0PqdmpLbGRZrjJ3ddCwcRSHncB78ke+4eYW7F1uorPTX+yVlqrAO6qYiwuxnYerXD3BwfsrjnPa+y4ZZYZTLH3jXsb2yMa9jg5jgC1wOQQehXHulfDbKCetqTiKFu446n0A9ycD7rodCVNRHSVdlr+Ky1Tuge0n9uSB/BBHwAl7pXan1fZtKxucIHv8AEVhb5RjJx/Ad93NXKcf4nWvpeT1knpfjT5/3el7INMzVcsmtL4wGsrM+BjI4hi6bh8jge3P7ltbhcV0kFFTtjYGxxRtDWNaMBoAwAF09ZqCNpLYzldrlu+HzNtt3fd6AvaOpC+bqmNvVwXj5b3LIeDwvga+V/wC5Ee08bF/iCybVxO/cF4fxMh/cVkyrlaf1FB7tr2u6FZheds9bJI4NdyvQNOQkuqPoCmVimV176TTInhQKZTKXM0zyplYk8KZS8ujTPKmVjlTKxeU0zyooCiTPa6VMqJlS5mmGVcrBZBeWZNaCUBUKily8j6ZTKwCq3M00pKmVCmVm5+V0yyoSihS5eBcq5WCyCkyAlTKFRZyvlWQVWKZWpkjJFjlMq9hkixymU7DS+rqb8E7XWys+mC9UoJx07wcH75YD/UuX2N0/4jf9S6le3IMgpKd3ltHJ/s2P+Vn/ALQMUlNQ2K8wYEtJVujDv+5u4f8Aou87FqJtD2dUTzw6qfLO77uLR/ZoXot/D7/Xw6Xlt4pxfS7/AN/Uv9zmkqnx7iGtOMLqBKSeSvvqKRrrlJ3fPPkuPSUdRUECONx+yS+HF9WyL7MeT0XZUenKh+DJ9IXc0unYmY3nJWbnF087G17jwCuwpbdLKRlpAXpIbZBF0YFy2RMZ0aFi8hpwbdQNpwCRyu0CwWQKY5+RkplMrElayzNMsq5WGVcqdzQTwoCoSgXO5+V0yyoSihTLLwRQVllfNZBMcyxllYkooVcsiRFcqJlcdquVEyopaKFkvOa01dRaPoaeruFPUzsnm7pracNJzgnzI9FxdK68t2pLnUWuOjr6Cvgj7x1PXQhji3jkYJ9RwcdV1xxy69teEesKi+cc8MrnNimje5vUNcCR8oJ4XSGJsrDI3qwOGR9liq+uVF01l1Pa73cbjQ26YySW+QRzOIw0u5BDfM4LTk4x0xldyl3PFBMoimwRRFLVVFETsKii8jqrX1Dpq809pmttyrauohEsbaKJryRlwxjcCT9JPRXHtldRPZ69F53SesbVqi3yVlE6SDupe5kiqQGPY/GQOpHPz5Fd6Z4RGZDNGGA4Li8YB9Mpdy6p4eC7doe97Pp34z3NTC/++3/Uux02yeHRdkoaNn1igh3O8gSwE/3JXpbhTUFwoXw3GGnqaN4DnNna10ZwcgnPHVfSmbTMp2Cm7oQMaGs7vG1rRxgY4wMLfxfuTFNeXQUGl4mu72qPePPJyu/go4YGgRsaB7BZtnhdEZWzRmMdXh4LR91WzxPcGsljcS3cAHA/T6/HusXO33XUZgAdFV01j1Na79V3CmtsxkdQy91K4jAc7z2+ZAxjOMemV3CW2XVVUURTsKqFisgtY1KqxVUK1lSKFcrw927SaK3agq7HFZbzX1dJgyCip2yDBDTnG7OPqA6L1FqukdxoqaodFLSSTx7xTVQDJWDn9Tc8dFbMsZuo5yLpdQ6ptOn6COsrqgOZNKIYmw/WXvPkPL7kgLtRUwFwa2eMkt3AB4zj1+FjV91fbKi+IqqchhFREQ/IaQ8fVjrj1VdUwNY17p4gx/6XF4w74Pmlo+qoWKqkoyWKIraIiiLmqooiDW3bnba652G2RW6jqamRlducKeF0haNjhkgA8LP8jz2Olvl8qKqt1JeKmidAI3Ewl7DgFo2knOAOhHAwOq2Mi6zmymMxidWhNJWe50ur9N11NYK630+Hx1BZQyRAEtOQ5znuLv1AbnbQfIccfbTViuFt1Na3UFnraoR1zu8dcrUaeWGMkbpHTtdtfxnGSfPjnC3qi3fU2/JOrVnZpYxY9c6jhqLHU0+6d5oKrw7u5bBuP0h/TkFmBz0PotqKIuXJnc7urJpUURYVVERAREQFqnX9iu917UbG+2OraNgpNpuMFOXtgOZTyemeccn9y2si3x53C7iWbaZ1toCSyaIiorX466VtTdmVFTMyEueT3cg3bW5wBnqc8nqvp2haPmt1XYobPbqmXT1MJO9gp6d1WWyuJO90ZcC/OW8k8YPwdxIuk9RlNbTrGkfytVM0EIZIdQ9ybm2pgpjbGPMQDed0HekmMk9OuR05548ti1NPoi9UVvtD4YfxCOXMFK+mfWx4fvxC48AHYcADjjnC3siv2nL6HVoy2acrBatTVFvorxDFPbHQ+FltQpWTP+nbtYJHOLhg8gevPPP101pWptepdE1kFtr4zPSP/E5HxyENO1zdr88MGCBjjgBbuRL6nK7OrVvZZZfwTVeoaeqsdVTSmeQ0lUadwiFPu4Y1/Q5+kgeg9ltJEXLkzueW6smhERYVVVEVlFRRE2NQS6Pnv3a1f31ou9FQuha+KrpC6ESODYhtDy0gjrx7ey5OqLfc7L2hWK40FouN1pYLV4Jr4m73F+HtG93QfqaSTjqStrIu3x7+mmer89/lW5P7MLd3lirH1lLeHuki8M/vRC5o3YbjJBLW+XkvQXelr6HWdLc7Rpq4y2+qsXhaeCOAtMBLSA1+eGY4yCeh81uRRW+pt+R1aBo9LXCssuhaCttVeIm19S2sHh5GmKN8kfLjjLAQDycea5utdKVdLqp7PwutmsbaFkFvbSUBrBCA0At2727XZ3HcSTk55zxvFE+05b3o6vP9n9vqbVpOgo6ySqc+Nrtoq2NbKxhcS1rgHOAwPLPAwOMYXoVEXDLK27aVFEUFIUREoIiICIiAiIgIiICqIgYTCIgIiICIiAiIgIiICiIgIiICIiAiIgIiICqIgIiIIiIgIiIKgCIrPcf/2Q=="/>
-          <p:cNvSpPr>
-            <a:spLocks noChangeAspect="1" noChangeArrowheads="1"/>
-          </p:cNvSpPr>
-          <p:nvPr/>
-        </p:nvSpPr>
-        <p:spPr bwMode="auto">
-          <a:xfrm>
-            <a:off x="0" y="-685800"/>
-            <a:ext cx="3200400" cy="1428750"/>
-          </a:xfrm>
-          <a:prstGeom prst="rect">
-            <a:avLst/>
-          </a:prstGeom>
-          <a:noFill/>
-          <a:ln w="9525">
-            <a:noFill/>
-            <a:miter lim="800000"/>
-            <a:headEnd/>
-            <a:tailEnd/>
-          </a:ln>
-        </p:spPr>
-        <p:txBody>
-          <a:bodyPr/>
-          <a:lstStyle/>
-          <a:p>
-            <a:endParaRPr lang="en-US"/>
-          </a:p>
-        </p:txBody>
-      </p:sp>
-    </p:spTree>
-    <p:extLst>
-      <p:ext uri="{BB962C8B-B14F-4D97-AF65-F5344CB8AC3E}">
-        <p14:creationId xmlns:p14="http://schemas.microsoft.com/office/powerpoint/2010/main" val="3759196800"/>
-      </p:ext>
-    </p:extLst>
-  </p:cSld>
-  <p:clrMapOvr>
-    <a:masterClrMapping/>
-  </p:clrMapOvr>
-  <p:transition xmlns:p14="http://schemas.microsoft.com/office/powerpoint/2010/main">
-    <p:fade/>
-  </p:transition>
-  <p:timing>
-    <p:tnLst>
-      <p:par>
-        <p:cTn xmlns:p14="http://schemas.microsoft.com/office/powerpoint/2010/main" id="1" dur="indefinite" restart="never" nodeType="tmRoot"/>
-      </p:par>
-    </p:tnLst>
-  </p:timing>
-</p:sld>
-</file>
-
-<file path=ppt/slides/slide18.xml><?xml version="1.0" encoding="utf-8"?>
-<p:sld xmlns:a="http://schemas.openxmlformats.org/drawingml/2006/main" xmlns:r="http://schemas.openxmlformats.org/officeDocument/2006/relationships" xmlns:p="http://schemas.openxmlformats.org/presentationml/2006/main">
-  <p:cSld>
-    <p:spTree>
-      <p:nvGrpSpPr>
-        <p:cNvPr id="1" name=""/>
-        <p:cNvGrpSpPr/>
-        <p:nvPr/>
-      </p:nvGrpSpPr>
-      <p:grpSpPr>
-        <a:xfrm>
-          <a:off x="0" y="0"/>
-          <a:ext cx="0" cy="0"/>
-          <a:chOff x="0" y="0"/>
-          <a:chExt cx="0" cy="0"/>
-        </a:xfrm>
-      </p:grpSpPr>
-      <p:sp>
-        <p:nvSpPr>
           <p:cNvPr id="4" name="Footer Placeholder 3"/>
           <p:cNvSpPr>
             <a:spLocks noGrp="1"/>
@@ -7623,7 +7308,7 @@
               <a:pPr>
                 <a:defRPr/>
               </a:pPr>
-              <a:t>18</a:t>
+              <a:t>17</a:t>
             </a:fld>
             <a:endParaRPr lang="en-US" dirty="0"/>
           </a:p>
@@ -7691,7 +7376,7 @@
 </p:sld>
 </file>
 
-<file path=ppt/slides/slide19.xml><?xml version="1.0" encoding="utf-8"?>
+<file path=ppt/slides/slide18.xml><?xml version="1.0" encoding="utf-8"?>
 <p:sld xmlns:a="http://schemas.openxmlformats.org/drawingml/2006/main" xmlns:r="http://schemas.openxmlformats.org/officeDocument/2006/relationships" xmlns:p="http://schemas.openxmlformats.org/presentationml/2006/main">
   <p:cSld>
     <p:spTree>
@@ -7764,9 +7449,6 @@
               </a:rPr>
               <a:t>Important terminology</a:t>
             </a:r>
-            <a:endParaRPr lang="en-US" dirty="0" smtClean="0">
-              <a:ea typeface="ＭＳ Ｐゴシック" pitchFamily="34" charset="-128"/>
-            </a:endParaRPr>
           </a:p>
         </p:txBody>
       </p:sp>
@@ -7806,9 +7488,6 @@
               </a:rPr>
               <a:t>Class == Object</a:t>
             </a:r>
-            <a:endParaRPr lang="en-US" dirty="0" smtClean="0">
-              <a:ea typeface="ＭＳ Ｐゴシック" pitchFamily="34" charset="-128"/>
-            </a:endParaRPr>
           </a:p>
           <a:p>
             <a:pPr>
@@ -7848,9 +7527,6 @@
               </a:rPr>
               <a:t>We will discuss this more in depth</a:t>
             </a:r>
-            <a:endParaRPr lang="en-US" dirty="0" smtClean="0">
-              <a:ea typeface="ＭＳ Ｐゴシック" pitchFamily="34" charset="-128"/>
-            </a:endParaRPr>
           </a:p>
           <a:p>
             <a:pPr lvl="1">
@@ -8351,9 +8027,6 @@
               </a:rPr>
               <a:t>Components</a:t>
             </a:r>
-            <a:endParaRPr lang="en-US" dirty="0" smtClean="0">
-              <a:ea typeface="ＭＳ Ｐゴシック" pitchFamily="34" charset="-128"/>
-            </a:endParaRPr>
           </a:p>
         </p:txBody>
       </p:sp>
@@ -8383,9 +8056,6 @@
               </a:rPr>
               <a:t>Component == domain (for mapping)</a:t>
             </a:r>
-            <a:endParaRPr lang="en-US" dirty="0" smtClean="0">
-              <a:ea typeface="ＭＳ Ｐゴシック" pitchFamily="34" charset="-128"/>
-            </a:endParaRPr>
           </a:p>
           <a:p>
             <a:pPr>
@@ -8451,9 +8121,6 @@
               </a:rPr>
               <a:t>Components are opaque from the outside</a:t>
             </a:r>
-            <a:endParaRPr lang="en-US" dirty="0" smtClean="0">
-              <a:ea typeface="ＭＳ Ｐゴシック" pitchFamily="34" charset="-128"/>
-            </a:endParaRPr>
           </a:p>
           <a:p>
             <a:pPr lvl="1">
@@ -9156,9 +8823,6 @@
               </a:rPr>
               <a:t>Components</a:t>
             </a:r>
-            <a:endParaRPr lang="en-US" dirty="0" smtClean="0">
-              <a:ea typeface="ＭＳ Ｐゴシック" pitchFamily="34" charset="-128"/>
-            </a:endParaRPr>
           </a:p>
         </p:txBody>
       </p:sp>
@@ -9346,9 +9010,6 @@
               </a:rPr>
               <a:t>Packages</a:t>
             </a:r>
-            <a:endParaRPr lang="en-US" dirty="0" smtClean="0">
-              <a:ea typeface="ＭＳ Ｐゴシック" pitchFamily="34" charset="-128"/>
-            </a:endParaRPr>
           </a:p>
         </p:txBody>
       </p:sp>
@@ -9378,9 +9039,6 @@
               </a:rPr>
               <a:t>Basis for organization in xtUML</a:t>
             </a:r>
-            <a:endParaRPr lang="en-US" dirty="0" smtClean="0">
-              <a:ea typeface="ＭＳ Ｐゴシック" pitchFamily="34" charset="-128"/>
-            </a:endParaRPr>
           </a:p>
           <a:p>
             <a:pPr>
@@ -9394,9 +9052,6 @@
               </a:rPr>
               <a:t>Mechanism for visibility</a:t>
             </a:r>
-            <a:endParaRPr lang="en-US" dirty="0" smtClean="0">
-              <a:ea typeface="ＭＳ Ｐゴシック" pitchFamily="34" charset="-128"/>
-            </a:endParaRPr>
           </a:p>
           <a:p>
             <a:pPr lvl="1">
@@ -9423,9 +9078,6 @@
               </a:rPr>
               <a:t>MASL projects are mapped to a system configuration package</a:t>
             </a:r>
-            <a:endParaRPr lang="en-US" dirty="0" smtClean="0">
-              <a:ea typeface="ＭＳ Ｐゴシック" pitchFamily="34" charset="-128"/>
-            </a:endParaRPr>
           </a:p>
           <a:p>
             <a:pPr lvl="1">
@@ -9926,9 +9578,6 @@
               </a:rPr>
               <a:t>Packages</a:t>
             </a:r>
-            <a:endParaRPr lang="en-US" dirty="0" smtClean="0">
-              <a:ea typeface="ＭＳ Ｐゴシック" pitchFamily="34" charset="-128"/>
-            </a:endParaRPr>
           </a:p>
         </p:txBody>
       </p:sp>
@@ -10303,9 +9952,6 @@
               </a:rPr>
               <a:t>Interfaces</a:t>
             </a:r>
-            <a:endParaRPr lang="en-US" dirty="0" smtClean="0">
-              <a:ea typeface="ＭＳ Ｐゴシック" pitchFamily="34" charset="-128"/>
-            </a:endParaRPr>
           </a:p>
         </p:txBody>
       </p:sp>
@@ -10335,9 +9981,6 @@
               </a:rPr>
               <a:t>The [only] mechanism for sending messages between components</a:t>
             </a:r>
-            <a:endParaRPr lang="en-US" dirty="0" smtClean="0">
-              <a:ea typeface="ＭＳ Ｐゴシック" pitchFamily="34" charset="-128"/>
-            </a:endParaRPr>
           </a:p>
           <a:p>
             <a:pPr>
@@ -10403,9 +10046,6 @@
               </a:rPr>
               <a:t>Message = generalized term</a:t>
             </a:r>
-            <a:endParaRPr lang="en-US" dirty="0" smtClean="0">
-              <a:ea typeface="ＭＳ Ｐゴシック" pitchFamily="34" charset="-128"/>
-            </a:endParaRPr>
           </a:p>
           <a:p>
             <a:pPr lvl="1">
@@ -10906,9 +10546,6 @@
               </a:rPr>
               <a:t>Interfaces</a:t>
             </a:r>
-            <a:endParaRPr lang="en-US" dirty="0" smtClean="0">
-              <a:ea typeface="ＭＳ Ｐゴシック" pitchFamily="34" charset="-128"/>
-            </a:endParaRPr>
           </a:p>
         </p:txBody>
       </p:sp>
@@ -10938,9 +10575,6 @@
               </a:rPr>
               <a:t>Components can “provide” or “require” an interface</a:t>
             </a:r>
-            <a:endParaRPr lang="en-US" dirty="0" smtClean="0">
-              <a:ea typeface="ＭＳ Ｐゴシック" pitchFamily="34" charset="-128"/>
-            </a:endParaRPr>
           </a:p>
           <a:p>
             <a:pPr>
@@ -11745,9 +11379,6 @@
               </a:rPr>
               <a:t>Interfaces</a:t>
             </a:r>
-            <a:endParaRPr lang="en-US" dirty="0" smtClean="0">
-              <a:ea typeface="ＭＳ Ｐゴシック" pitchFamily="34" charset="-128"/>
-            </a:endParaRPr>
           </a:p>
         </p:txBody>
       </p:sp>

</xml_diff>